<commit_message>
PDF and PPTX slides
</commit_message>
<xml_diff>
--- a/slides/slides-4.pptx
+++ b/slides/slides-4.pptx
@@ -174,7 +174,7 @@
 <file path=ppt/revisionInfo.xml><?xml version="1.0" encoding="utf-8"?>
 <p1510:revInfo xmlns:a="http://schemas.openxmlformats.org/drawingml/2006/main" xmlns:r="http://schemas.openxmlformats.org/officeDocument/2006/relationships" xmlns:p1510="http://schemas.microsoft.com/office/powerpoint/2015/10/main">
   <p1510:revLst>
-    <p1510:client id="{076C9DA1-3587-DB41-A498-E3CFA5732936}" v="20" dt="2022-12-18T16:27:33.876"/>
+    <p1510:client id="{076C9DA1-3587-DB41-A498-E3CFA5732936}" v="23" dt="2022-12-20T14:27:33.104"/>
   </p1510:revLst>
 </p1510:revInfo>
 </file>
@@ -4182,7 +4182,7 @@
   <pc:docChgLst>
     <pc:chgData name="Alessandro Carrega" userId="aad2c8b9-e6be-4150-b5bc-cbfa57d8782b" providerId="ADAL" clId="{076C9DA1-3587-DB41-A498-E3CFA5732936}"/>
     <pc:docChg chg="undo custSel addSld delSld modSld sldOrd modMainMaster">
-      <pc:chgData name="Alessandro Carrega" userId="aad2c8b9-e6be-4150-b5bc-cbfa57d8782b" providerId="ADAL" clId="{076C9DA1-3587-DB41-A498-E3CFA5732936}" dt="2022-12-19T21:05:52.079" v="4751" actId="20577"/>
+      <pc:chgData name="Alessandro Carrega" userId="aad2c8b9-e6be-4150-b5bc-cbfa57d8782b" providerId="ADAL" clId="{076C9DA1-3587-DB41-A498-E3CFA5732936}" dt="2022-12-20T14:27:50.397" v="4853"/>
       <pc:docMkLst>
         <pc:docMk/>
       </pc:docMkLst>
@@ -4225,7 +4225,7 @@
         </pc:spChg>
       </pc:sldChg>
       <pc:sldChg chg="modSp mod">
-        <pc:chgData name="Alessandro Carrega" userId="aad2c8b9-e6be-4150-b5bc-cbfa57d8782b" providerId="ADAL" clId="{076C9DA1-3587-DB41-A498-E3CFA5732936}" dt="2022-12-19T21:05:28.635" v="4742" actId="27636"/>
+        <pc:chgData name="Alessandro Carrega" userId="aad2c8b9-e6be-4150-b5bc-cbfa57d8782b" providerId="ADAL" clId="{076C9DA1-3587-DB41-A498-E3CFA5732936}" dt="2022-12-20T14:27:50.397" v="4853"/>
         <pc:sldMkLst>
           <pc:docMk/>
           <pc:sldMk cId="1057794292" sldId="381"/>
@@ -4239,7 +4239,7 @@
           </ac:spMkLst>
         </pc:spChg>
         <pc:spChg chg="mod">
-          <ac:chgData name="Alessandro Carrega" userId="aad2c8b9-e6be-4150-b5bc-cbfa57d8782b" providerId="ADAL" clId="{076C9DA1-3587-DB41-A498-E3CFA5732936}" dt="2022-12-19T21:05:28.635" v="4742" actId="27636"/>
+          <ac:chgData name="Alessandro Carrega" userId="aad2c8b9-e6be-4150-b5bc-cbfa57d8782b" providerId="ADAL" clId="{076C9DA1-3587-DB41-A498-E3CFA5732936}" dt="2022-12-20T14:27:50.397" v="4853"/>
           <ac:spMkLst>
             <pc:docMk/>
             <pc:sldMk cId="1057794292" sldId="381"/>
@@ -5438,7 +5438,7 @@
           <a:p>
             <a:fld id="{72147225-8790-BB43-A491-05E01506A2DA}" type="datetimeFigureOut">
               <a:rPr lang="en-GB" smtClean="0"/>
-              <a:t>19/12/2022</a:t>
+              <a:t>20/12/2022</a:t>
             </a:fld>
             <a:endParaRPr lang="en-GB" dirty="0"/>
           </a:p>
@@ -13613,7 +13613,7 @@
         <p:spPr/>
         <p:txBody>
           <a:bodyPr>
-            <a:normAutofit fontScale="85000" lnSpcReduction="20000"/>
+            <a:normAutofit fontScale="70000" lnSpcReduction="20000"/>
           </a:bodyPr>
           <a:lstStyle/>
           <a:p>
@@ -13650,6 +13650,22 @@
           <a:p>
             <a:r>
               <a:rPr lang="en-IT" dirty="0"/>
+              <a:t>GitHub repository:</a:t>
+            </a:r>
+          </a:p>
+          <a:p>
+            <a:pPr lvl="1"/>
+            <a:r>
+              <a:rPr lang="en-GB" dirty="0">
+                <a:hlinkClick r:id="rId4"/>
+              </a:rPr>
+              <a:t>https://github.com/tnt-lab-unige-cnit/phd-stiet-cyber-security-approaches-cloud-edge-environments</a:t>
+            </a:r>
+            <a:endParaRPr lang="en-IT" dirty="0"/>
+          </a:p>
+          <a:p>
+            <a:r>
+              <a:rPr lang="en-IT" dirty="0"/>
               <a:t>Optional homework.</a:t>
             </a:r>
           </a:p>
@@ -13657,7 +13673,7 @@
             <a:pPr lvl="1"/>
             <a:r>
               <a:rPr lang="en-IT" dirty="0"/>
-              <a:t>Available in Teams.</a:t>
+              <a:t>Available in Teams and GitHub.</a:t>
             </a:r>
           </a:p>
           <a:p>
@@ -13715,24 +13731,21 @@
           <a:p>
             <a:pPr lvl="1"/>
             <a:r>
-              <a:rPr lang="en-IT" b="1" dirty="0"/>
+              <a:rPr lang="en-IT" b="1"/>
               <a:t>Quiz</a:t>
             </a:r>
             <a:r>
-              <a:rPr lang="en-IT" dirty="0"/>
+              <a:rPr lang="en-IT"/>
               <a:t>: </a:t>
             </a:r>
             <a:r>
-              <a:rPr lang="en-IT" i="1" dirty="0"/>
+              <a:rPr lang="en-IT" i="1"/>
               <a:t>multiple choice questions</a:t>
             </a:r>
             <a:r>
-              <a:rPr lang="en-IT" dirty="0"/>
+              <a:rPr lang="en-IT"/>
               <a:t>.</a:t>
             </a:r>
-          </a:p>
-          <a:p>
-            <a:pPr lvl="1"/>
             <a:endParaRPr lang="en-IT" dirty="0"/>
           </a:p>
         </p:txBody>

</xml_diff>